<commit_message>
added arrowhead to L3.4 Slide 19
</commit_message>
<xml_diff>
--- a/Slides/Lesson 3.4 Two Draggable Cats.pptx
+++ b/Slides/Lesson 3.4 Two Draggable Cats.pptx
@@ -235,7 +235,7 @@
             <a:fld id="{CF8F25F6-E1EF-4065-8525-42EDEBD9BD22}" type="datetimeFigureOut">
               <a:rPr lang="en-US" smtClean="0"/>
               <a:pPr/>
-              <a:t>10/12/2016</a:t>
+              <a:t>10/14/2016</a:t>
             </a:fld>
             <a:endParaRPr lang="en-US"/>
           </a:p>
@@ -882,7 +882,7 @@
           <a:p>
             <a:fld id="{2F1F79F5-7BEC-496A-AFC7-876E38F64D71}" type="datetime1">
               <a:rPr lang="en-US" smtClean="0"/>
-              <a:t>10/12/2016</a:t>
+              <a:t>10/14/2016</a:t>
             </a:fld>
             <a:endParaRPr lang="en-US"/>
           </a:p>
@@ -977,7 +977,7 @@
           <a:p>
             <a:fld id="{0A05703A-7669-4FEA-9056-25299B4D29D4}" type="datetime1">
               <a:rPr lang="en-US" smtClean="0"/>
-              <a:t>10/12/2016</a:t>
+              <a:t>10/14/2016</a:t>
             </a:fld>
             <a:endParaRPr lang="en-US"/>
           </a:p>
@@ -1252,7 +1252,7 @@
           <a:p>
             <a:fld id="{6E5077B5-BB57-49DB-88CA-226A139E5C01}" type="datetime1">
               <a:rPr lang="en-US" smtClean="0"/>
-              <a:t>10/12/2016</a:t>
+              <a:t>10/14/2016</a:t>
             </a:fld>
             <a:endParaRPr lang="en-US"/>
           </a:p>
@@ -1504,7 +1504,7 @@
           <a:p>
             <a:fld id="{C48D9447-CBD6-49A1-89FD-8512A8CF8999}" type="datetime1">
               <a:rPr lang="en-US" smtClean="0"/>
-              <a:t>10/12/2016</a:t>
+              <a:t>10/14/2016</a:t>
             </a:fld>
             <a:endParaRPr lang="en-US"/>
           </a:p>
@@ -1672,7 +1672,7 @@
           <a:p>
             <a:fld id="{A3639A2A-823D-48B7-9ACE-7FAF42870BA9}" type="datetime1">
               <a:rPr lang="en-US" smtClean="0"/>
-              <a:t>10/12/2016</a:t>
+              <a:t>10/14/2016</a:t>
             </a:fld>
             <a:endParaRPr lang="en-US"/>
           </a:p>
@@ -1850,7 +1850,7 @@
           <a:p>
             <a:fld id="{ED1B6996-82E9-463C-972C-7B56056E426C}" type="datetime1">
               <a:rPr lang="en-US" smtClean="0"/>
-              <a:t>10/12/2016</a:t>
+              <a:t>10/14/2016</a:t>
             </a:fld>
             <a:endParaRPr lang="en-US"/>
           </a:p>
@@ -1968,7 +1968,7 @@
             <a:fld id="{CBE6DF32-C57F-4EA4-9518-EB5F320F182D}" type="datetimeFigureOut">
               <a:rPr lang="en-US" smtClean="0"/>
               <a:pPr/>
-              <a:t>10/12/2016</a:t>
+              <a:t>10/14/2016</a:t>
             </a:fld>
             <a:endParaRPr lang="en-US"/>
           </a:p>
@@ -2192,7 +2192,7 @@
           <a:p>
             <a:fld id="{E22ED4DA-448D-4BB1-B935-CC112220207B}" type="datetime1">
               <a:rPr lang="en-US" smtClean="0"/>
-              <a:t>10/12/2016</a:t>
+              <a:t>10/14/2016</a:t>
             </a:fld>
             <a:endParaRPr lang="en-US"/>
           </a:p>
@@ -2365,7 +2365,7 @@
           <a:p>
             <a:fld id="{E22ED4DA-448D-4BB1-B935-CC112220207B}" type="datetime1">
               <a:rPr lang="en-US" smtClean="0"/>
-              <a:t>10/12/2016</a:t>
+              <a:t>10/14/2016</a:t>
             </a:fld>
             <a:endParaRPr lang="en-US"/>
           </a:p>
@@ -2625,7 +2625,7 @@
           <a:p>
             <a:fld id="{FF5D65A6-AB94-4435-B0B7-3743215FA46C}" type="datetime1">
               <a:rPr lang="en-US" smtClean="0"/>
-              <a:t>10/12/2016</a:t>
+              <a:t>10/14/2016</a:t>
             </a:fld>
             <a:endParaRPr lang="en-US"/>
           </a:p>
@@ -2801,7 +2801,7 @@
           <a:p>
             <a:fld id="{FF5D65A6-AB94-4435-B0B7-3743215FA46C}" type="datetime1">
               <a:rPr lang="en-US" smtClean="0"/>
-              <a:t>10/12/2016</a:t>
+              <a:t>10/14/2016</a:t>
             </a:fld>
             <a:endParaRPr lang="en-US"/>
           </a:p>
@@ -3095,7 +3095,7 @@
           <a:p>
             <a:fld id="{7C193DC4-6EF0-48C9-B29C-616106A645E1}" type="datetime1">
               <a:rPr lang="en-US" smtClean="0"/>
-              <a:t>10/12/2016</a:t>
+              <a:t>10/14/2016</a:t>
             </a:fld>
             <a:endParaRPr lang="en-US"/>
           </a:p>
@@ -3380,7 +3380,7 @@
           <a:p>
             <a:fld id="{5D1846AD-9252-4647-9435-4C2AC365653A}" type="datetime1">
               <a:rPr lang="en-US" smtClean="0"/>
-              <a:t>10/12/2016</a:t>
+              <a:t>10/14/2016</a:t>
             </a:fld>
             <a:endParaRPr lang="en-US"/>
           </a:p>
@@ -3799,7 +3799,7 @@
           <a:p>
             <a:fld id="{CE56DC10-3561-4063-A6AF-C1CC7A41040A}" type="datetime1">
               <a:rPr lang="en-US" smtClean="0"/>
-              <a:t>10/12/2016</a:t>
+              <a:t>10/14/2016</a:t>
             </a:fld>
             <a:endParaRPr lang="en-US"/>
           </a:p>
@@ -3916,7 +3916,7 @@
           <a:p>
             <a:fld id="{2F7B77F5-1464-4F6B-92A8-64FC8A508293}" type="datetime1">
               <a:rPr lang="en-US" smtClean="0"/>
-              <a:t>10/12/2016</a:t>
+              <a:t>10/14/2016</a:t>
             </a:fld>
             <a:endParaRPr lang="en-US"/>
           </a:p>
@@ -4139,7 +4139,7 @@
           <a:p>
             <a:fld id="{02B3F677-983B-48DB-ADFD-63FE6CBC7FB2}" type="datetime1">
               <a:rPr lang="en-US" smtClean="0"/>
-              <a:t>10/12/2016</a:t>
+              <a:t>10/14/2016</a:t>
             </a:fld>
             <a:endParaRPr lang="en-US"/>
           </a:p>
@@ -8593,7 +8593,7 @@
           <a:noFill/>
           <a:ln>
             <a:headEnd type="none"/>
-            <a:tailEnd w="lg" len="lg"/>
+            <a:tailEnd type="arrow" w="lg" len="lg"/>
           </a:ln>
         </p:spPr>
         <p:style>

</xml_diff>